<commit_message>
Se cambian las cosas jajajajajajajajja
</commit_message>
<xml_diff>
--- a/CuartaEntrega/ModeloCasosDeUso/is.pptx
+++ b/CuartaEntrega/ModeloCasosDeUso/is.pptx
@@ -296,7 +296,7 @@
             <a:fld id="{7A847CFC-816F-41D0-AAC0-9BF4FEBC753E}" type="datetimeFigureOut">
               <a:rPr lang="es-ES" smtClean="0"/>
               <a:pPr/>
-              <a:t>03/04/2013</a:t>
+              <a:t>05/04/2013</a:t>
             </a:fld>
             <a:endParaRPr lang="es-ES"/>
           </a:p>
@@ -463,7 +463,7 @@
             <a:fld id="{7A847CFC-816F-41D0-AAC0-9BF4FEBC753E}" type="datetimeFigureOut">
               <a:rPr lang="es-ES" smtClean="0"/>
               <a:pPr/>
-              <a:t>03/04/2013</a:t>
+              <a:t>05/04/2013</a:t>
             </a:fld>
             <a:endParaRPr lang="es-ES"/>
           </a:p>
@@ -640,7 +640,7 @@
             <a:fld id="{7A847CFC-816F-41D0-AAC0-9BF4FEBC753E}" type="datetimeFigureOut">
               <a:rPr lang="es-ES" smtClean="0"/>
               <a:pPr/>
-              <a:t>03/04/2013</a:t>
+              <a:t>05/04/2013</a:t>
             </a:fld>
             <a:endParaRPr lang="es-ES"/>
           </a:p>
@@ -807,7 +807,7 @@
             <a:fld id="{7A847CFC-816F-41D0-AAC0-9BF4FEBC753E}" type="datetimeFigureOut">
               <a:rPr lang="es-ES" smtClean="0"/>
               <a:pPr/>
-              <a:t>03/04/2013</a:t>
+              <a:t>05/04/2013</a:t>
             </a:fld>
             <a:endParaRPr lang="es-ES"/>
           </a:p>
@@ -1050,7 +1050,7 @@
             <a:fld id="{7A847CFC-816F-41D0-AAC0-9BF4FEBC753E}" type="datetimeFigureOut">
               <a:rPr lang="es-ES" smtClean="0"/>
               <a:pPr/>
-              <a:t>03/04/2013</a:t>
+              <a:t>05/04/2013</a:t>
             </a:fld>
             <a:endParaRPr lang="es-ES"/>
           </a:p>
@@ -1335,7 +1335,7 @@
             <a:fld id="{7A847CFC-816F-41D0-AAC0-9BF4FEBC753E}" type="datetimeFigureOut">
               <a:rPr lang="es-ES" smtClean="0"/>
               <a:pPr/>
-              <a:t>03/04/2013</a:t>
+              <a:t>05/04/2013</a:t>
             </a:fld>
             <a:endParaRPr lang="es-ES"/>
           </a:p>
@@ -1754,7 +1754,7 @@
             <a:fld id="{7A847CFC-816F-41D0-AAC0-9BF4FEBC753E}" type="datetimeFigureOut">
               <a:rPr lang="es-ES" smtClean="0"/>
               <a:pPr/>
-              <a:t>03/04/2013</a:t>
+              <a:t>05/04/2013</a:t>
             </a:fld>
             <a:endParaRPr lang="es-ES"/>
           </a:p>
@@ -1869,7 +1869,7 @@
             <a:fld id="{7A847CFC-816F-41D0-AAC0-9BF4FEBC753E}" type="datetimeFigureOut">
               <a:rPr lang="es-ES" smtClean="0"/>
               <a:pPr/>
-              <a:t>03/04/2013</a:t>
+              <a:t>05/04/2013</a:t>
             </a:fld>
             <a:endParaRPr lang="es-ES"/>
           </a:p>
@@ -1961,7 +1961,7 @@
             <a:fld id="{7A847CFC-816F-41D0-AAC0-9BF4FEBC753E}" type="datetimeFigureOut">
               <a:rPr lang="es-ES" smtClean="0"/>
               <a:pPr/>
-              <a:t>03/04/2013</a:t>
+              <a:t>05/04/2013</a:t>
             </a:fld>
             <a:endParaRPr lang="es-ES"/>
           </a:p>
@@ -2235,7 +2235,7 @@
             <a:fld id="{7A847CFC-816F-41D0-AAC0-9BF4FEBC753E}" type="datetimeFigureOut">
               <a:rPr lang="es-ES" smtClean="0"/>
               <a:pPr/>
-              <a:t>03/04/2013</a:t>
+              <a:t>05/04/2013</a:t>
             </a:fld>
             <a:endParaRPr lang="es-ES"/>
           </a:p>
@@ -2485,7 +2485,7 @@
             <a:fld id="{7A847CFC-816F-41D0-AAC0-9BF4FEBC753E}" type="datetimeFigureOut">
               <a:rPr lang="es-ES" smtClean="0"/>
               <a:pPr/>
-              <a:t>03/04/2013</a:t>
+              <a:t>05/04/2013</a:t>
             </a:fld>
             <a:endParaRPr lang="es-ES"/>
           </a:p>
@@ -2695,7 +2695,7 @@
             <a:fld id="{7A847CFC-816F-41D0-AAC0-9BF4FEBC753E}" type="datetimeFigureOut">
               <a:rPr lang="es-ES" smtClean="0"/>
               <a:pPr/>
-              <a:t>03/04/2013</a:t>
+              <a:t>05/04/2013</a:t>
             </a:fld>
             <a:endParaRPr lang="es-ES"/>
           </a:p>
@@ -3878,7 +3878,7 @@
         </p:nvSpPr>
         <p:spPr>
           <a:xfrm>
-            <a:off x="467544" y="1340768"/>
+            <a:off x="467544" y="1052736"/>
             <a:ext cx="3384376" cy="1008112"/>
           </a:xfrm>
           <a:prstGeom prst="ellipse">
@@ -3922,7 +3922,7 @@
         </p:nvSpPr>
         <p:spPr>
           <a:xfrm>
-            <a:off x="5436096" y="1412776"/>
+            <a:off x="5759624" y="908720"/>
             <a:ext cx="3384376" cy="1008112"/>
           </a:xfrm>
           <a:prstGeom prst="ellipse">
@@ -3966,7 +3966,7 @@
         </p:nvSpPr>
         <p:spPr>
           <a:xfrm>
-            <a:off x="683568" y="4365104"/>
+            <a:off x="251520" y="3861048"/>
             <a:ext cx="3384376" cy="1008112"/>
           </a:xfrm>
           <a:prstGeom prst="ellipse">
@@ -4010,7 +4010,7 @@
         </p:nvSpPr>
         <p:spPr>
           <a:xfrm>
-            <a:off x="5148064" y="4437112"/>
+            <a:off x="5759624" y="4005064"/>
             <a:ext cx="3384376" cy="1008112"/>
           </a:xfrm>
           <a:prstGeom prst="ellipse">
@@ -4053,9 +4053,9 @@
           <p:nvPr/>
         </p:nvCxnSpPr>
         <p:spPr>
-          <a:xfrm flipH="1" flipV="1">
-            <a:off x="3275856" y="2348880"/>
-            <a:ext cx="720080" cy="432048"/>
+          <a:xfrm flipH="1">
+            <a:off x="3779912" y="1700808"/>
+            <a:ext cx="504056" cy="144016"/>
           </a:xfrm>
           <a:prstGeom prst="straightConnector1">
             <a:avLst/>
@@ -4082,114 +4082,6 @@
           </a:fontRef>
         </p:style>
       </p:cxnSp>
-      <p:cxnSp>
-        <p:nvCxnSpPr>
-          <p:cNvPr id="10" name="9 Conector recto de flecha"/>
-          <p:cNvCxnSpPr/>
-          <p:nvPr/>
-        </p:nvCxnSpPr>
-        <p:spPr>
-          <a:xfrm flipV="1">
-            <a:off x="5148064" y="2348880"/>
-            <a:ext cx="720080" cy="360040"/>
-          </a:xfrm>
-          <a:prstGeom prst="straightConnector1">
-            <a:avLst/>
-          </a:prstGeom>
-          <a:ln>
-            <a:solidFill>
-              <a:schemeClr val="tx1"/>
-            </a:solidFill>
-            <a:tailEnd type="arrow"/>
-          </a:ln>
-        </p:spPr>
-        <p:style>
-          <a:lnRef idx="1">
-            <a:schemeClr val="accent1"/>
-          </a:lnRef>
-          <a:fillRef idx="0">
-            <a:schemeClr val="accent1"/>
-          </a:fillRef>
-          <a:effectRef idx="0">
-            <a:schemeClr val="accent1"/>
-          </a:effectRef>
-          <a:fontRef idx="minor">
-            <a:schemeClr val="tx1"/>
-          </a:fontRef>
-        </p:style>
-      </p:cxnSp>
-      <p:cxnSp>
-        <p:nvCxnSpPr>
-          <p:cNvPr id="11" name="10 Conector recto de flecha"/>
-          <p:cNvCxnSpPr/>
-          <p:nvPr/>
-        </p:nvCxnSpPr>
-        <p:spPr>
-          <a:xfrm>
-            <a:off x="5148064" y="3645024"/>
-            <a:ext cx="720080" cy="792088"/>
-          </a:xfrm>
-          <a:prstGeom prst="straightConnector1">
-            <a:avLst/>
-          </a:prstGeom>
-          <a:ln>
-            <a:solidFill>
-              <a:schemeClr val="tx1"/>
-            </a:solidFill>
-            <a:tailEnd type="arrow"/>
-          </a:ln>
-        </p:spPr>
-        <p:style>
-          <a:lnRef idx="1">
-            <a:schemeClr val="accent1"/>
-          </a:lnRef>
-          <a:fillRef idx="0">
-            <a:schemeClr val="accent1"/>
-          </a:fillRef>
-          <a:effectRef idx="0">
-            <a:schemeClr val="accent1"/>
-          </a:effectRef>
-          <a:fontRef idx="minor">
-            <a:schemeClr val="tx1"/>
-          </a:fontRef>
-        </p:style>
-      </p:cxnSp>
-      <p:cxnSp>
-        <p:nvCxnSpPr>
-          <p:cNvPr id="12" name="11 Conector recto de flecha"/>
-          <p:cNvCxnSpPr/>
-          <p:nvPr/>
-        </p:nvCxnSpPr>
-        <p:spPr>
-          <a:xfrm flipH="1">
-            <a:off x="3131840" y="3573016"/>
-            <a:ext cx="864096" cy="720080"/>
-          </a:xfrm>
-          <a:prstGeom prst="straightConnector1">
-            <a:avLst/>
-          </a:prstGeom>
-          <a:ln>
-            <a:solidFill>
-              <a:schemeClr val="tx1"/>
-            </a:solidFill>
-            <a:tailEnd type="arrow"/>
-          </a:ln>
-        </p:spPr>
-        <p:style>
-          <a:lnRef idx="1">
-            <a:schemeClr val="accent1"/>
-          </a:lnRef>
-          <a:fillRef idx="0">
-            <a:schemeClr val="accent1"/>
-          </a:fillRef>
-          <a:effectRef idx="0">
-            <a:schemeClr val="accent1"/>
-          </a:effectRef>
-          <a:fontRef idx="minor">
-            <a:schemeClr val="tx1"/>
-          </a:fontRef>
-        </p:style>
-      </p:cxnSp>
       <p:sp>
         <p:nvSpPr>
           <p:cNvPr id="19" name="18 CuadroTexto"/>
@@ -4198,8 +4090,8 @@
         </p:nvSpPr>
         <p:spPr>
           <a:xfrm>
-            <a:off x="4004256" y="4149080"/>
-            <a:ext cx="1296144" cy="369332"/>
+            <a:off x="4004256" y="5291916"/>
+            <a:ext cx="1296144" cy="646331"/>
           </a:xfrm>
           <a:prstGeom prst="rect">
             <a:avLst/>
@@ -4215,7 +4107,7 @@
             <a:pPr algn="ctr"/>
             <a:r>
               <a:rPr lang="es-ES" dirty="0" smtClean="0"/>
-              <a:t>Limpieza</a:t>
+              <a:t>Personal de Limpieza</a:t>
             </a:r>
             <a:endParaRPr lang="es-ES" dirty="0"/>
           </a:p>
@@ -4238,7 +4130,7 @@
         </p:blipFill>
         <p:spPr bwMode="auto">
           <a:xfrm>
-            <a:off x="4067944" y="2494175"/>
+            <a:off x="4067944" y="3637011"/>
             <a:ext cx="1152128" cy="1717966"/>
           </a:xfrm>
           <a:prstGeom prst="rect">
@@ -4247,6 +4139,171 @@
           <a:noFill/>
         </p:spPr>
       </p:pic>
+      <p:sp>
+        <p:nvSpPr>
+          <p:cNvPr id="16" name="15 CuadroTexto"/>
+          <p:cNvSpPr txBox="1"/>
+          <p:nvPr/>
+        </p:nvSpPr>
+        <p:spPr>
+          <a:xfrm>
+            <a:off x="4067944" y="2564904"/>
+            <a:ext cx="1296144" cy="646331"/>
+          </a:xfrm>
+          <a:prstGeom prst="rect">
+            <a:avLst/>
+          </a:prstGeom>
+          <a:noFill/>
+        </p:spPr>
+        <p:txBody>
+          <a:bodyPr wrap="square" rtlCol="0">
+            <a:spAutoFit/>
+          </a:bodyPr>
+          <a:lstStyle/>
+          <a:p>
+            <a:pPr algn="ctr"/>
+            <a:r>
+              <a:rPr lang="es-ES" dirty="0" smtClean="0"/>
+              <a:t>Encargado de limpieza</a:t>
+            </a:r>
+            <a:endParaRPr lang="es-ES" dirty="0"/>
+          </a:p>
+        </p:txBody>
+      </p:sp>
+      <p:pic>
+        <p:nvPicPr>
+          <p:cNvPr id="17" name="Picture 2" descr="C:\hlocal\is\TerceraEntrega20-3-13\ModeloCasosDeUso\monigote.png"/>
+          <p:cNvPicPr>
+            <a:picLocks noChangeAspect="1" noChangeArrowheads="1"/>
+          </p:cNvPicPr>
+          <p:nvPr/>
+        </p:nvPicPr>
+        <p:blipFill>
+          <a:blip r:embed="rId2" cstate="print"/>
+          <a:srcRect/>
+          <a:stretch>
+            <a:fillRect/>
+          </a:stretch>
+        </p:blipFill>
+        <p:spPr bwMode="auto">
+          <a:xfrm>
+            <a:off x="4131632" y="909999"/>
+            <a:ext cx="1152128" cy="1717966"/>
+          </a:xfrm>
+          <a:prstGeom prst="rect">
+            <a:avLst/>
+          </a:prstGeom>
+          <a:noFill/>
+        </p:spPr>
+      </p:pic>
+      <p:cxnSp>
+        <p:nvCxnSpPr>
+          <p:cNvPr id="21" name="20 Conector recto de flecha"/>
+          <p:cNvCxnSpPr/>
+          <p:nvPr/>
+        </p:nvCxnSpPr>
+        <p:spPr>
+          <a:xfrm flipV="1">
+            <a:off x="5364088" y="1628800"/>
+            <a:ext cx="360040" cy="144016"/>
+          </a:xfrm>
+          <a:prstGeom prst="straightConnector1">
+            <a:avLst/>
+          </a:prstGeom>
+          <a:ln>
+            <a:solidFill>
+              <a:schemeClr val="tx1"/>
+            </a:solidFill>
+            <a:tailEnd type="arrow"/>
+          </a:ln>
+        </p:spPr>
+        <p:style>
+          <a:lnRef idx="1">
+            <a:schemeClr val="accent1"/>
+          </a:lnRef>
+          <a:fillRef idx="0">
+            <a:schemeClr val="accent1"/>
+          </a:fillRef>
+          <a:effectRef idx="0">
+            <a:schemeClr val="accent1"/>
+          </a:effectRef>
+          <a:fontRef idx="minor">
+            <a:schemeClr val="tx1"/>
+          </a:fontRef>
+        </p:style>
+      </p:cxnSp>
+      <p:cxnSp>
+        <p:nvCxnSpPr>
+          <p:cNvPr id="25" name="24 Conector recto de flecha"/>
+          <p:cNvCxnSpPr/>
+          <p:nvPr/>
+        </p:nvCxnSpPr>
+        <p:spPr>
+          <a:xfrm flipH="1" flipV="1">
+            <a:off x="3779912" y="4293096"/>
+            <a:ext cx="432048" cy="72008"/>
+          </a:xfrm>
+          <a:prstGeom prst="straightConnector1">
+            <a:avLst/>
+          </a:prstGeom>
+          <a:ln>
+            <a:solidFill>
+              <a:schemeClr val="tx1"/>
+            </a:solidFill>
+            <a:tailEnd type="arrow"/>
+          </a:ln>
+        </p:spPr>
+        <p:style>
+          <a:lnRef idx="1">
+            <a:schemeClr val="accent1"/>
+          </a:lnRef>
+          <a:fillRef idx="0">
+            <a:schemeClr val="accent1"/>
+          </a:fillRef>
+          <a:effectRef idx="0">
+            <a:schemeClr val="accent1"/>
+          </a:effectRef>
+          <a:fontRef idx="minor">
+            <a:schemeClr val="tx1"/>
+          </a:fontRef>
+        </p:style>
+      </p:cxnSp>
+      <p:cxnSp>
+        <p:nvCxnSpPr>
+          <p:cNvPr id="26" name="25 Conector recto de flecha"/>
+          <p:cNvCxnSpPr/>
+          <p:nvPr/>
+        </p:nvCxnSpPr>
+        <p:spPr>
+          <a:xfrm>
+            <a:off x="5076056" y="4365104"/>
+            <a:ext cx="648072" cy="72008"/>
+          </a:xfrm>
+          <a:prstGeom prst="straightConnector1">
+            <a:avLst/>
+          </a:prstGeom>
+          <a:ln>
+            <a:solidFill>
+              <a:schemeClr val="tx1"/>
+            </a:solidFill>
+            <a:tailEnd type="arrow"/>
+          </a:ln>
+        </p:spPr>
+        <p:style>
+          <a:lnRef idx="1">
+            <a:schemeClr val="accent1"/>
+          </a:lnRef>
+          <a:fillRef idx="0">
+            <a:schemeClr val="accent1"/>
+          </a:fillRef>
+          <a:effectRef idx="0">
+            <a:schemeClr val="accent1"/>
+          </a:effectRef>
+          <a:fontRef idx="minor">
+            <a:schemeClr val="tx1"/>
+          </a:fontRef>
+        </p:style>
+      </p:cxnSp>
     </p:spTree>
   </p:cSld>
   <p:clrMapOvr>
@@ -4855,7 +4912,7 @@
               <a:pPr algn="ctr"/>
               <a:r>
                 <a:rPr lang="es-ES" dirty="0" smtClean="0"/>
-                <a:t>Metre</a:t>
+                <a:t>Maître</a:t>
               </a:r>
               <a:endParaRPr lang="es-ES" dirty="0"/>
             </a:p>

</xml_diff>